<commit_message>
wip - feedback updates
</commit_message>
<xml_diff>
--- a/lectures/Week 1 - Course Overview.pptx
+++ b/lectures/Week 1 - Course Overview.pptx
@@ -5,7 +5,7 @@
     <p:sldMasterId id="2147483718" r:id="rId1"/>
   </p:sldMasterIdLst>
   <p:notesMasterIdLst>
-    <p:notesMasterId r:id="rId14"/>
+    <p:notesMasterId r:id="rId16"/>
   </p:notesMasterIdLst>
   <p:sldIdLst>
     <p:sldId id="256" r:id="rId2"/>
@@ -17,9 +17,11 @@
     <p:sldId id="275" r:id="rId8"/>
     <p:sldId id="276" r:id="rId9"/>
     <p:sldId id="852" r:id="rId10"/>
-    <p:sldId id="844" r:id="rId11"/>
-    <p:sldId id="845" r:id="rId12"/>
-    <p:sldId id="846" r:id="rId13"/>
+    <p:sldId id="853" r:id="rId11"/>
+    <p:sldId id="844" r:id="rId12"/>
+    <p:sldId id="845" r:id="rId13"/>
+    <p:sldId id="854" r:id="rId14"/>
+    <p:sldId id="846" r:id="rId15"/>
   </p:sldIdLst>
   <p:sldSz cx="12192000" cy="6858000"/>
   <p:notesSz cx="6858000" cy="9144000"/>
@@ -540,7 +542,7 @@
           <a:p>
             <a:fld id="{068FE4ED-59E9-4944-A32F-9556C2E2A90E}" type="slidenum">
               <a:rPr lang="en-US" smtClean="0"/>
-              <a:t>12</a:t>
+              <a:t>14</a:t>
             </a:fld>
             <a:endParaRPr lang="en-US"/>
           </a:p>
@@ -3475,7 +3477,7 @@
           <a:p>
             <a:r>
               <a:rPr lang="en-US" sz="2800" dirty="0"/>
-              <a:t>Summer 2021</a:t>
+              <a:t>Spring 2022</a:t>
             </a:r>
             <a:endParaRPr lang="en-US" sz="2800" dirty="0">
               <a:solidFill>
@@ -3814,13 +3816,7 @@
       </p:grpSpPr>
       <p:sp>
         <p:nvSpPr>
-          <p:cNvPr id="2" name="Title 1">
-            <a:extLst>
-              <a:ext uri="{FF2B5EF4-FFF2-40B4-BE49-F238E27FC236}">
-                <a16:creationId xmlns:a16="http://schemas.microsoft.com/office/drawing/2014/main" id="{8F29ACB7-3B63-49E7-96D7-15DA3109CDE5}"/>
-              </a:ext>
-            </a:extLst>
-          </p:cNvPr>
+          <p:cNvPr id="2" name="Title 1"/>
           <p:cNvSpPr>
             <a:spLocks noGrp="1"/>
           </p:cNvSpPr>
@@ -3830,92 +3826,21 @@
         </p:nvSpPr>
         <p:spPr/>
         <p:txBody>
-          <a:bodyPr/>
-          <a:lstStyle/>
-          <a:p>
-            <a:r>
-              <a:rPr lang="en-US" b="1" dirty="0"/>
-              <a:t>Assignments, Assessments, and Evaluations</a:t>
-            </a:r>
-          </a:p>
-        </p:txBody>
-      </p:sp>
-      <p:sp>
-        <p:nvSpPr>
-          <p:cNvPr id="3" name="Content Placeholder 2">
-            <a:extLst>
-              <a:ext uri="{FF2B5EF4-FFF2-40B4-BE49-F238E27FC236}">
-                <a16:creationId xmlns:a16="http://schemas.microsoft.com/office/drawing/2014/main" id="{EE97DE04-F64B-4CFF-A456-22A3858468CF}"/>
-              </a:ext>
-            </a:extLst>
-          </p:cNvPr>
-          <p:cNvSpPr>
-            <a:spLocks noGrp="1"/>
-          </p:cNvSpPr>
-          <p:nvPr>
-            <p:ph idx="1"/>
-          </p:nvPr>
-        </p:nvSpPr>
-        <p:spPr>
-          <a:xfrm>
-            <a:off x="838200" y="1825625"/>
-            <a:ext cx="10273879" cy="4351338"/>
-          </a:xfrm>
-        </p:spPr>
-        <p:txBody>
-          <a:bodyPr/>
-          <a:lstStyle/>
-          <a:p>
-            <a:r>
-              <a:rPr lang="en-US" dirty="0"/>
-              <a:t>Individual assignment with multiple deliverables: </a:t>
-            </a:r>
-          </a:p>
-          <a:p>
-            <a:pPr lvl="1"/>
-            <a:r>
-              <a:rPr lang="en-US" dirty="0"/>
-              <a:t>Design, analyze, and implement software architecture</a:t>
-            </a:r>
-          </a:p>
-          <a:p>
-            <a:pPr lvl="1"/>
-            <a:r>
-              <a:rPr lang="en-US" dirty="0"/>
-              <a:t>Apply architecture patterns to achieve extensibility</a:t>
-            </a:r>
-          </a:p>
-          <a:p>
-            <a:pPr lvl="1"/>
-            <a:r>
-              <a:rPr lang="en-US" dirty="0"/>
-              <a:t>Reason about various architecture quality attributes</a:t>
-            </a:r>
-          </a:p>
-          <a:p>
-            <a:pPr lvl="1"/>
-            <a:endParaRPr lang="en-US" dirty="0"/>
-          </a:p>
-          <a:p>
-            <a:r>
-              <a:rPr lang="en-US" dirty="0"/>
-              <a:t>Reading assignments, 2 foundational and 2 modern software architecture papers</a:t>
-            </a:r>
-          </a:p>
-          <a:p>
-            <a:endParaRPr lang="en-US" dirty="0"/>
-          </a:p>
-        </p:txBody>
-      </p:sp>
-      <p:sp>
-        <p:nvSpPr>
-          <p:cNvPr id="4" name="Slide Number Placeholder 3">
-            <a:extLst>
-              <a:ext uri="{FF2B5EF4-FFF2-40B4-BE49-F238E27FC236}">
-                <a16:creationId xmlns:a16="http://schemas.microsoft.com/office/drawing/2014/main" id="{542EAC42-38A0-4516-814B-016A18951906}"/>
-              </a:ext>
-            </a:extLst>
-          </p:cNvPr>
+          <a:bodyPr>
+            <a:normAutofit/>
+          </a:bodyPr>
+          <a:lstStyle/>
+          <a:p>
+            <a:r>
+              <a:rPr lang="en-US" sz="3600" b="1" dirty="0"/>
+              <a:t>Learning Material</a:t>
+            </a:r>
+          </a:p>
+        </p:txBody>
+      </p:sp>
+      <p:sp>
+        <p:nvSpPr>
+          <p:cNvPr id="4" name="Slide Number Placeholder 3"/>
           <p:cNvSpPr>
             <a:spLocks noGrp="1"/>
           </p:cNvSpPr>
@@ -3936,10 +3861,119 @@
           </a:p>
         </p:txBody>
       </p:sp>
+      <p:sp>
+        <p:nvSpPr>
+          <p:cNvPr id="6" name="Content Placeholder 5">
+            <a:extLst>
+              <a:ext uri="{FF2B5EF4-FFF2-40B4-BE49-F238E27FC236}">
+                <a16:creationId xmlns:a16="http://schemas.microsoft.com/office/drawing/2014/main" id="{F0EAE5D6-6F4E-4902-B3E1-FC9E443ECF84}"/>
+              </a:ext>
+            </a:extLst>
+          </p:cNvPr>
+          <p:cNvSpPr>
+            <a:spLocks noGrp="1"/>
+          </p:cNvSpPr>
+          <p:nvPr>
+            <p:ph idx="1"/>
+          </p:nvPr>
+        </p:nvSpPr>
+        <p:spPr>
+          <a:xfrm>
+            <a:off x="723143" y="1825625"/>
+            <a:ext cx="6713170" cy="2954804"/>
+          </a:xfrm>
+        </p:spPr>
+        <p:txBody>
+          <a:bodyPr>
+            <a:normAutofit/>
+          </a:bodyPr>
+          <a:lstStyle/>
+          <a:p>
+            <a:r>
+              <a:rPr lang="en-US" altLang="zh-CN" dirty="0"/>
+              <a:t>Reference Book 5: </a:t>
+            </a:r>
+          </a:p>
+          <a:p>
+            <a:pPr marL="457200" lvl="1" indent="0">
+              <a:buNone/>
+            </a:pPr>
+            <a:r>
+              <a:rPr lang="en-US" altLang="zh-CN" dirty="0"/>
+              <a:t>“</a:t>
+            </a:r>
+            <a:r>
+              <a:rPr lang="en-US" altLang="zh-CN" i="1" dirty="0"/>
+              <a:t>The Software Architect Elevator” </a:t>
+            </a:r>
+          </a:p>
+          <a:p>
+            <a:pPr marL="457200" lvl="1" indent="0">
+              <a:buNone/>
+            </a:pPr>
+            <a:r>
+              <a:rPr lang="en-US" altLang="zh-CN" dirty="0"/>
+              <a:t>by Gregor </a:t>
+            </a:r>
+            <a:r>
+              <a:rPr lang="en-US" altLang="zh-CN" dirty="0" err="1"/>
+              <a:t>Hohpe</a:t>
+            </a:r>
+            <a:endParaRPr lang="en-US" altLang="zh-CN" dirty="0"/>
+          </a:p>
+        </p:txBody>
+      </p:sp>
+      <p:pic>
+        <p:nvPicPr>
+          <p:cNvPr id="3074" name="Picture 2" descr="Software Architect Elevator Book Cover">
+            <a:extLst>
+              <a:ext uri="{FF2B5EF4-FFF2-40B4-BE49-F238E27FC236}">
+                <a16:creationId xmlns:a16="http://schemas.microsoft.com/office/drawing/2014/main" id="{A5F90783-7664-774A-9301-B17320D865A5}"/>
+              </a:ext>
+            </a:extLst>
+          </p:cNvPr>
+          <p:cNvPicPr>
+            <a:picLocks noChangeAspect="1" noChangeArrowheads="1"/>
+          </p:cNvPicPr>
+          <p:nvPr/>
+        </p:nvPicPr>
+        <p:blipFill>
+          <a:blip r:embed="rId2">
+            <a:extLst>
+              <a:ext uri="{28A0092B-C50C-407E-A947-70E740481C1C}">
+                <a14:useLocalDpi xmlns:a14="http://schemas.microsoft.com/office/drawing/2010/main" val="0"/>
+              </a:ext>
+            </a:extLst>
+          </a:blip>
+          <a:srcRect/>
+          <a:stretch>
+            <a:fillRect/>
+          </a:stretch>
+        </p:blipFill>
+        <p:spPr bwMode="auto">
+          <a:xfrm>
+            <a:off x="7986218" y="1143000"/>
+            <a:ext cx="3175000" cy="4572000"/>
+          </a:xfrm>
+          <a:prstGeom prst="rect">
+            <a:avLst/>
+          </a:prstGeom>
+          <a:noFill/>
+          <a:extLst>
+            <a:ext uri="{909E8E84-426E-40DD-AFC4-6F175D3DCCD1}">
+              <a14:hiddenFill xmlns:a14="http://schemas.microsoft.com/office/drawing/2010/main">
+                <a:solidFill>
+                  <a:srgbClr val="FFFFFF"/>
+                </a:solidFill>
+              </a14:hiddenFill>
+            </a:ext>
+          </a:extLst>
+        </p:spPr>
+      </p:pic>
     </p:spTree>
     <p:extLst>
       <p:ext uri="{BB962C8B-B14F-4D97-AF65-F5344CB8AC3E}">
-        <p14:creationId xmlns:p14="http://schemas.microsoft.com/office/powerpoint/2010/main" val="429238667"/>
+        <p14:creationId xmlns:p14="http://schemas.microsoft.com/office/powerpoint/2010/main" val="3358783516"/>
       </p:ext>
     </p:extLst>
   </p:cSld>
@@ -4017,48 +4051,47 @@
           </a:xfrm>
         </p:spPr>
         <p:txBody>
-          <a:bodyPr>
-            <a:normAutofit/>
-          </a:bodyPr>
+          <a:bodyPr/>
           <a:lstStyle/>
           <a:p>
             <a:r>
               <a:rPr lang="en-US" dirty="0"/>
-              <a:t>Grading Component: </a:t>
+              <a:t>Individual assignment with multiple deliverables: </a:t>
             </a:r>
           </a:p>
           <a:p>
             <a:pPr lvl="1"/>
             <a:r>
               <a:rPr lang="en-US" dirty="0"/>
-              <a:t>Course Reading summaries and other assignments 40%</a:t>
-            </a:r>
-          </a:p>
-          <a:p>
-            <a:pPr marL="914400" lvl="2" indent="0">
-              <a:buNone/>
-            </a:pPr>
+              <a:t>Design, analyze, and implement software architecture</a:t>
+            </a:r>
+          </a:p>
+          <a:p>
+            <a:pPr lvl="1"/>
+            <a:r>
+              <a:rPr lang="en-US" dirty="0"/>
+              <a:t>Apply architecture patterns to achieve extensibility</a:t>
+            </a:r>
+          </a:p>
+          <a:p>
+            <a:pPr lvl="1"/>
+            <a:r>
+              <a:rPr lang="en-US" dirty="0"/>
+              <a:t>Reason about various architecture quality attributes</a:t>
+            </a:r>
+          </a:p>
+          <a:p>
+            <a:pPr lvl="1"/>
             <a:endParaRPr lang="en-US" dirty="0"/>
           </a:p>
           <a:p>
-            <a:pPr lvl="1"/>
             <a:r>
               <a:rPr lang="en-US" dirty="0"/>
-              <a:t>Course Project 50%</a:t>
-            </a:r>
-          </a:p>
-          <a:p>
-            <a:pPr marL="914400" lvl="2" indent="0">
-              <a:buNone/>
-            </a:pPr>
+              <a:t>Reading assignments, 2 foundational and 2 modern software architecture papers</a:t>
+            </a:r>
+          </a:p>
+          <a:p>
             <a:endParaRPr lang="en-US" dirty="0"/>
-          </a:p>
-          <a:p>
-            <a:pPr lvl="1"/>
-            <a:r>
-              <a:rPr lang="en-US" dirty="0"/>
-              <a:t>Participation: 10%</a:t>
-            </a:r>
           </a:p>
         </p:txBody>
       </p:sp>
@@ -4094,7 +4127,7 @@
     </p:spTree>
     <p:extLst>
       <p:ext uri="{BB962C8B-B14F-4D97-AF65-F5344CB8AC3E}">
-        <p14:creationId xmlns:p14="http://schemas.microsoft.com/office/powerpoint/2010/main" val="3221273072"/>
+        <p14:creationId xmlns:p14="http://schemas.microsoft.com/office/powerpoint/2010/main" val="429238667"/>
       </p:ext>
     </p:extLst>
   </p:cSld>
@@ -4126,6 +4159,317 @@
           <p:cNvPr id="2" name="Title 1">
             <a:extLst>
               <a:ext uri="{FF2B5EF4-FFF2-40B4-BE49-F238E27FC236}">
+                <a16:creationId xmlns:a16="http://schemas.microsoft.com/office/drawing/2014/main" id="{8F29ACB7-3B63-49E7-96D7-15DA3109CDE5}"/>
+              </a:ext>
+            </a:extLst>
+          </p:cNvPr>
+          <p:cNvSpPr>
+            <a:spLocks noGrp="1"/>
+          </p:cNvSpPr>
+          <p:nvPr>
+            <p:ph type="title"/>
+          </p:nvPr>
+        </p:nvSpPr>
+        <p:spPr/>
+        <p:txBody>
+          <a:bodyPr/>
+          <a:lstStyle/>
+          <a:p>
+            <a:r>
+              <a:rPr lang="en-US" b="1" dirty="0"/>
+              <a:t>Assignments, Assessments, and Evaluations</a:t>
+            </a:r>
+          </a:p>
+        </p:txBody>
+      </p:sp>
+      <p:sp>
+        <p:nvSpPr>
+          <p:cNvPr id="3" name="Content Placeholder 2">
+            <a:extLst>
+              <a:ext uri="{FF2B5EF4-FFF2-40B4-BE49-F238E27FC236}">
+                <a16:creationId xmlns:a16="http://schemas.microsoft.com/office/drawing/2014/main" id="{EE97DE04-F64B-4CFF-A456-22A3858468CF}"/>
+              </a:ext>
+            </a:extLst>
+          </p:cNvPr>
+          <p:cNvSpPr>
+            <a:spLocks noGrp="1"/>
+          </p:cNvSpPr>
+          <p:nvPr>
+            <p:ph idx="1"/>
+          </p:nvPr>
+        </p:nvSpPr>
+        <p:spPr>
+          <a:xfrm>
+            <a:off x="838200" y="1825625"/>
+            <a:ext cx="10273879" cy="4351338"/>
+          </a:xfrm>
+        </p:spPr>
+        <p:txBody>
+          <a:bodyPr>
+            <a:normAutofit/>
+          </a:bodyPr>
+          <a:lstStyle/>
+          <a:p>
+            <a:r>
+              <a:rPr lang="en-US" dirty="0"/>
+              <a:t>Grading Component: </a:t>
+            </a:r>
+          </a:p>
+          <a:p>
+            <a:pPr lvl="1"/>
+            <a:r>
+              <a:rPr lang="en-US" dirty="0"/>
+              <a:t>Course Reading summaries and other assignments 40%</a:t>
+            </a:r>
+          </a:p>
+          <a:p>
+            <a:pPr marL="914400" lvl="2" indent="0">
+              <a:buNone/>
+            </a:pPr>
+            <a:endParaRPr lang="en-US" dirty="0"/>
+          </a:p>
+          <a:p>
+            <a:pPr lvl="1"/>
+            <a:r>
+              <a:rPr lang="en-US" dirty="0"/>
+              <a:t>Course Project 50%</a:t>
+            </a:r>
+          </a:p>
+          <a:p>
+            <a:pPr marL="914400" lvl="2" indent="0">
+              <a:buNone/>
+            </a:pPr>
+            <a:endParaRPr lang="en-US" dirty="0"/>
+          </a:p>
+          <a:p>
+            <a:pPr lvl="1"/>
+            <a:r>
+              <a:rPr lang="en-US" dirty="0"/>
+              <a:t>Participation: 10%</a:t>
+            </a:r>
+          </a:p>
+        </p:txBody>
+      </p:sp>
+      <p:sp>
+        <p:nvSpPr>
+          <p:cNvPr id="4" name="Slide Number Placeholder 3">
+            <a:extLst>
+              <a:ext uri="{FF2B5EF4-FFF2-40B4-BE49-F238E27FC236}">
+                <a16:creationId xmlns:a16="http://schemas.microsoft.com/office/drawing/2014/main" id="{542EAC42-38A0-4516-814B-016A18951906}"/>
+              </a:ext>
+            </a:extLst>
+          </p:cNvPr>
+          <p:cNvSpPr>
+            <a:spLocks noGrp="1"/>
+          </p:cNvSpPr>
+          <p:nvPr>
+            <p:ph type="sldNum" sz="quarter" idx="12"/>
+          </p:nvPr>
+        </p:nvSpPr>
+        <p:spPr/>
+        <p:txBody>
+          <a:bodyPr/>
+          <a:lstStyle/>
+          <a:p>
+            <a:fld id="{69E57DC2-970A-4B3E-BB1C-7A09969E49DF}" type="slidenum">
+              <a:rPr lang="en-US" smtClean="0"/>
+              <a:t>12</a:t>
+            </a:fld>
+            <a:endParaRPr lang="en-US" dirty="0"/>
+          </a:p>
+        </p:txBody>
+      </p:sp>
+    </p:spTree>
+    <p:extLst>
+      <p:ext uri="{BB962C8B-B14F-4D97-AF65-F5344CB8AC3E}">
+        <p14:creationId xmlns:p14="http://schemas.microsoft.com/office/powerpoint/2010/main" val="3221273072"/>
+      </p:ext>
+    </p:extLst>
+  </p:cSld>
+  <p:clrMapOvr>
+    <a:masterClrMapping/>
+  </p:clrMapOvr>
+</p:sld>
+</file>
+
+<file path=ppt/slides/slide13.xml><?xml version="1.0" encoding="utf-8"?>
+<p:sld xmlns:a="http://schemas.openxmlformats.org/drawingml/2006/main" xmlns:r="http://schemas.openxmlformats.org/officeDocument/2006/relationships" xmlns:p="http://schemas.openxmlformats.org/presentationml/2006/main">
+  <p:cSld>
+    <p:spTree>
+      <p:nvGrpSpPr>
+        <p:cNvPr id="1" name=""/>
+        <p:cNvGrpSpPr/>
+        <p:nvPr/>
+      </p:nvGrpSpPr>
+      <p:grpSpPr>
+        <a:xfrm>
+          <a:off x="0" y="0"/>
+          <a:ext cx="0" cy="0"/>
+          <a:chOff x="0" y="0"/>
+          <a:chExt cx="0" cy="0"/>
+        </a:xfrm>
+      </p:grpSpPr>
+      <p:sp>
+        <p:nvSpPr>
+          <p:cNvPr id="2" name="Title 1">
+            <a:extLst>
+              <a:ext uri="{FF2B5EF4-FFF2-40B4-BE49-F238E27FC236}">
+                <a16:creationId xmlns:a16="http://schemas.microsoft.com/office/drawing/2014/main" id="{8F29ACB7-3B63-49E7-96D7-15DA3109CDE5}"/>
+              </a:ext>
+            </a:extLst>
+          </p:cNvPr>
+          <p:cNvSpPr>
+            <a:spLocks noGrp="1"/>
+          </p:cNvSpPr>
+          <p:nvPr>
+            <p:ph type="title"/>
+          </p:nvPr>
+        </p:nvSpPr>
+        <p:spPr>
+          <a:xfrm>
+            <a:off x="164892" y="175937"/>
+            <a:ext cx="11617377" cy="1325563"/>
+          </a:xfrm>
+        </p:spPr>
+        <p:txBody>
+          <a:bodyPr/>
+          <a:lstStyle/>
+          <a:p>
+            <a:r>
+              <a:rPr lang="en-US" b="1" dirty="0"/>
+              <a:t>Slack will be our PRIMARY mode of communication</a:t>
+            </a:r>
+          </a:p>
+        </p:txBody>
+      </p:sp>
+      <p:sp>
+        <p:nvSpPr>
+          <p:cNvPr id="4" name="Slide Number Placeholder 3">
+            <a:extLst>
+              <a:ext uri="{FF2B5EF4-FFF2-40B4-BE49-F238E27FC236}">
+                <a16:creationId xmlns:a16="http://schemas.microsoft.com/office/drawing/2014/main" id="{542EAC42-38A0-4516-814B-016A18951906}"/>
+              </a:ext>
+            </a:extLst>
+          </p:cNvPr>
+          <p:cNvSpPr>
+            <a:spLocks noGrp="1"/>
+          </p:cNvSpPr>
+          <p:nvPr>
+            <p:ph type="sldNum" sz="quarter" idx="12"/>
+          </p:nvPr>
+        </p:nvSpPr>
+        <p:spPr/>
+        <p:txBody>
+          <a:bodyPr/>
+          <a:lstStyle/>
+          <a:p>
+            <a:fld id="{69E57DC2-970A-4B3E-BB1C-7A09969E49DF}" type="slidenum">
+              <a:rPr lang="en-US" smtClean="0"/>
+              <a:t>13</a:t>
+            </a:fld>
+            <a:endParaRPr lang="en-US" dirty="0"/>
+          </a:p>
+        </p:txBody>
+      </p:sp>
+      <p:pic>
+        <p:nvPicPr>
+          <p:cNvPr id="7" name="Picture 6">
+            <a:extLst>
+              <a:ext uri="{FF2B5EF4-FFF2-40B4-BE49-F238E27FC236}">
+                <a16:creationId xmlns:a16="http://schemas.microsoft.com/office/drawing/2014/main" id="{212AD27B-F960-1845-A1E7-6E507DCC43E5}"/>
+              </a:ext>
+            </a:extLst>
+          </p:cNvPr>
+          <p:cNvPicPr>
+            <a:picLocks noChangeAspect="1"/>
+          </p:cNvPicPr>
+          <p:nvPr/>
+        </p:nvPicPr>
+        <p:blipFill>
+          <a:blip r:embed="rId2"/>
+          <a:stretch>
+            <a:fillRect/>
+          </a:stretch>
+        </p:blipFill>
+        <p:spPr>
+          <a:xfrm>
+            <a:off x="2938072" y="1679508"/>
+            <a:ext cx="7283034" cy="4169050"/>
+          </a:xfrm>
+          <a:prstGeom prst="rect">
+            <a:avLst/>
+          </a:prstGeom>
+        </p:spPr>
+      </p:pic>
+      <p:sp>
+        <p:nvSpPr>
+          <p:cNvPr id="8" name="Rectangle 7">
+            <a:extLst>
+              <a:ext uri="{FF2B5EF4-FFF2-40B4-BE49-F238E27FC236}">
+                <a16:creationId xmlns:a16="http://schemas.microsoft.com/office/drawing/2014/main" id="{DD4ACB9B-1C25-5B41-B459-1A6DC067AC89}"/>
+              </a:ext>
+            </a:extLst>
+          </p:cNvPr>
+          <p:cNvSpPr/>
+          <p:nvPr/>
+        </p:nvSpPr>
+        <p:spPr>
+          <a:xfrm>
+            <a:off x="4490134" y="6026566"/>
+            <a:ext cx="4755533" cy="461665"/>
+          </a:xfrm>
+          <a:prstGeom prst="rect">
+            <a:avLst/>
+          </a:prstGeom>
+        </p:spPr>
+        <p:txBody>
+          <a:bodyPr wrap="none">
+            <a:spAutoFit/>
+          </a:bodyPr>
+          <a:lstStyle/>
+          <a:p>
+            <a:r>
+              <a:rPr lang="en-US" sz="2400" dirty="0"/>
+              <a:t>https://drexel-se577-2022.slack.com</a:t>
+            </a:r>
+          </a:p>
+        </p:txBody>
+      </p:sp>
+    </p:spTree>
+    <p:extLst>
+      <p:ext uri="{BB962C8B-B14F-4D97-AF65-F5344CB8AC3E}">
+        <p14:creationId xmlns:p14="http://schemas.microsoft.com/office/powerpoint/2010/main" val="1475521508"/>
+      </p:ext>
+    </p:extLst>
+  </p:cSld>
+  <p:clrMapOvr>
+    <a:masterClrMapping/>
+  </p:clrMapOvr>
+</p:sld>
+</file>
+
+<file path=ppt/slides/slide14.xml><?xml version="1.0" encoding="utf-8"?>
+<p:sld xmlns:a="http://schemas.openxmlformats.org/drawingml/2006/main" xmlns:r="http://schemas.openxmlformats.org/officeDocument/2006/relationships" xmlns:p="http://schemas.openxmlformats.org/presentationml/2006/main">
+  <p:cSld>
+    <p:spTree>
+      <p:nvGrpSpPr>
+        <p:cNvPr id="1" name=""/>
+        <p:cNvGrpSpPr/>
+        <p:nvPr/>
+      </p:nvGrpSpPr>
+      <p:grpSpPr>
+        <a:xfrm>
+          <a:off x="0" y="0"/>
+          <a:ext cx="0" cy="0"/>
+          <a:chOff x="0" y="0"/>
+          <a:chExt cx="0" cy="0"/>
+        </a:xfrm>
+      </p:grpSpPr>
+      <p:sp>
+        <p:nvSpPr>
+          <p:cNvPr id="2" name="Title 1">
+            <a:extLst>
+              <a:ext uri="{FF2B5EF4-FFF2-40B4-BE49-F238E27FC236}">
                 <a16:creationId xmlns:a16="http://schemas.microsoft.com/office/drawing/2014/main" id="{AD4D4935-D8AE-4457-8ECD-E9622C739125}"/>
               </a:ext>
             </a:extLst>
@@ -4222,7 +4566,7 @@
           <a:p>
             <a:fld id="{69E57DC2-970A-4B3E-BB1C-7A09969E49DF}" type="slidenum">
               <a:rPr lang="en-US" smtClean="0"/>
-              <a:t>12</a:t>
+              <a:t>14</a:t>
             </a:fld>
             <a:endParaRPr lang="en-US" dirty="0"/>
           </a:p>

</xml_diff>